<commit_message>
work flow for sentiment analysis
</commit_message>
<xml_diff>
--- a/baej.lih.project-1.pptx
+++ b/baej.lih.project-1.pptx
@@ -5,7 +5,7 @@
     <p:sldMasterId id="2147483696" r:id="rId1"/>
   </p:sldMasterIdLst>
   <p:notesMasterIdLst>
-    <p:notesMasterId r:id="rId12"/>
+    <p:notesMasterId r:id="rId13"/>
   </p:notesMasterIdLst>
   <p:sldIdLst>
     <p:sldId id="256" r:id="rId2"/>
@@ -16,8 +16,9 @@
     <p:sldId id="264" r:id="rId7"/>
     <p:sldId id="259" r:id="rId8"/>
     <p:sldId id="260" r:id="rId9"/>
-    <p:sldId id="265" r:id="rId10"/>
-    <p:sldId id="261" r:id="rId11"/>
+    <p:sldId id="266" r:id="rId10"/>
+    <p:sldId id="265" r:id="rId11"/>
+    <p:sldId id="261" r:id="rId12"/>
   </p:sldIdLst>
   <p:sldSz cx="9144000" cy="6858000" type="screen4x3"/>
   <p:notesSz cx="6858000" cy="9144000"/>
@@ -618,7 +619,7 @@
           <a:p>
             <a:fld id="{067E96DB-0F97-464C-BDF1-DF474AC9290B}" type="slidenum">
               <a:rPr lang="en-US" smtClean="0"/>
-              <a:t>10</a:t>
+              <a:t>11</a:t>
             </a:fld>
             <a:endParaRPr lang="en-US"/>
           </a:p>
@@ -4010,6 +4011,78 @@
           <a:p>
             <a:r>
               <a:rPr lang="en-US" dirty="0" smtClean="0"/>
+              <a:t>Classification</a:t>
+            </a:r>
+            <a:endParaRPr lang="en-US" dirty="0"/>
+          </a:p>
+        </p:txBody>
+      </p:sp>
+      <p:sp>
+        <p:nvSpPr>
+          <p:cNvPr id="3" name="Content Placeholder 2"/>
+          <p:cNvSpPr>
+            <a:spLocks noGrp="1"/>
+          </p:cNvSpPr>
+          <p:nvPr>
+            <p:ph idx="1"/>
+          </p:nvPr>
+        </p:nvSpPr>
+        <p:spPr/>
+        <p:txBody>
+          <a:bodyPr/>
+          <a:lstStyle/>
+          <a:p>
+            <a:endParaRPr lang="en-US"/>
+          </a:p>
+        </p:txBody>
+      </p:sp>
+    </p:spTree>
+    <p:extLst>
+      <p:ext uri="{BB962C8B-B14F-4D97-AF65-F5344CB8AC3E}">
+        <p14:creationId xmlns:p14="http://schemas.microsoft.com/office/powerpoint/2010/main" val="951282186"/>
+      </p:ext>
+    </p:extLst>
+  </p:cSld>
+  <p:clrMapOvr>
+    <a:masterClrMapping/>
+  </p:clrMapOvr>
+</p:sld>
+</file>
+
+<file path=ppt/slides/slide11.xml><?xml version="1.0" encoding="utf-8"?>
+<p:sld xmlns:a="http://schemas.openxmlformats.org/drawingml/2006/main" xmlns:r="http://schemas.openxmlformats.org/officeDocument/2006/relationships" xmlns:p="http://schemas.openxmlformats.org/presentationml/2006/main">
+  <p:cSld>
+    <p:spTree>
+      <p:nvGrpSpPr>
+        <p:cNvPr id="1" name=""/>
+        <p:cNvGrpSpPr/>
+        <p:nvPr/>
+      </p:nvGrpSpPr>
+      <p:grpSpPr>
+        <a:xfrm>
+          <a:off x="0" y="0"/>
+          <a:ext cx="0" cy="0"/>
+          <a:chOff x="0" y="0"/>
+          <a:chExt cx="0" cy="0"/>
+        </a:xfrm>
+      </p:grpSpPr>
+      <p:sp>
+        <p:nvSpPr>
+          <p:cNvPr id="2" name="Title 1"/>
+          <p:cNvSpPr>
+            <a:spLocks noGrp="1"/>
+          </p:cNvSpPr>
+          <p:nvPr>
+            <p:ph type="title"/>
+          </p:nvPr>
+        </p:nvSpPr>
+        <p:spPr/>
+        <p:txBody>
+          <a:bodyPr/>
+          <a:lstStyle/>
+          <a:p>
+            <a:r>
+              <a:rPr lang="en-US" dirty="0" smtClean="0"/>
               <a:t>Conclusion</a:t>
             </a:r>
             <a:endParaRPr lang="en-US" dirty="0"/>
@@ -4105,11 +4178,7 @@
           <a:p>
             <a:r>
               <a:rPr lang="en-US" dirty="0" smtClean="0"/>
-              <a:t>The objective of this study was to find what makes females decide yes to a </a:t>
-            </a:r>
-            <a:r>
-              <a:rPr lang="en-US" dirty="0" smtClean="0"/>
-              <a:t>male</a:t>
+              <a:t>The objective of this study was to find what makes females decide yes to a male</a:t>
             </a:r>
           </a:p>
           <a:p>
@@ -4130,13 +4199,8 @@
             <a:pPr lvl="1"/>
             <a:r>
               <a:rPr lang="en-US" dirty="0" smtClean="0"/>
-              <a:t>We wish to giv</a:t>
-            </a:r>
-            <a:r>
-              <a:rPr lang="en-US" dirty="0" smtClean="0"/>
-              <a:t>e insight to males on how to get the most dates out of speed dating</a:t>
-            </a:r>
-            <a:endParaRPr lang="en-US" dirty="0" smtClean="0"/>
+              <a:t>We wish to give insight to males on how to get the most dates out of speed dating</a:t>
+            </a:r>
           </a:p>
           <a:p>
             <a:r>
@@ -4152,17 +4216,8 @@
             </a:r>
             <a:r>
               <a:rPr lang="en-US" dirty="0" smtClean="0"/>
-              <a:t>s </a:t>
-            </a:r>
-            <a:r>
-              <a:rPr lang="en-US" dirty="0" smtClean="0"/>
-              <a:t>a male, if you are attractive and </a:t>
-            </a:r>
-            <a:r>
-              <a:rPr lang="en-US" dirty="0" smtClean="0"/>
-              <a:t>funny, you will get the most yes</a:t>
-            </a:r>
-            <a:endParaRPr lang="en-US" dirty="0" smtClean="0"/>
+              <a:t>s a male, if you are attractive and funny, you will get the most yes</a:t>
+            </a:r>
           </a:p>
         </p:txBody>
       </p:sp>
@@ -4263,11 +4318,7 @@
             <a:pPr lvl="1"/>
             <a:r>
               <a:rPr lang="en-US" dirty="0" smtClean="0"/>
-              <a:t>Only things a man can </a:t>
-            </a:r>
-            <a:r>
-              <a:rPr lang="en-US" dirty="0" smtClean="0"/>
-              <a:t>control</a:t>
+              <a:t>Only things a man can control</a:t>
             </a:r>
           </a:p>
           <a:p>
@@ -4283,7 +4334,6 @@
               <a:rPr lang="en-US" dirty="0" smtClean="0"/>
               <a:t>, tuition, or income</a:t>
             </a:r>
-            <a:endParaRPr lang="en-US" dirty="0" smtClean="0"/>
           </a:p>
         </p:txBody>
       </p:sp>
@@ -4378,11 +4428,7 @@
             </a:r>
             <a:r>
               <a:rPr lang="en-US" dirty="0" smtClean="0"/>
-              <a:t> rating </a:t>
-            </a:r>
-            <a:r>
-              <a:rPr lang="en-US" dirty="0" smtClean="0"/>
-              <a:t>for a single attribute value (</a:t>
+              <a:t> rating for a single attribute value (</a:t>
             </a:r>
             <a:r>
               <a:rPr lang="en-US" dirty="0" err="1" smtClean="0"/>
@@ -4422,15 +4468,7 @@
             </a:r>
             <a:r>
               <a:rPr lang="en-US" dirty="0" smtClean="0"/>
-              <a:t>) </a:t>
-            </a:r>
-            <a:r>
-              <a:rPr lang="en-US" dirty="0" smtClean="0"/>
-              <a:t>from </a:t>
-            </a:r>
-            <a:r>
-              <a:rPr lang="en-US" dirty="0" smtClean="0"/>
-              <a:t>partners, use mean score of the </a:t>
+              <a:t>) from partners, use mean score of the </a:t>
             </a:r>
             <a:r>
               <a:rPr lang="en-US" dirty="0" err="1" smtClean="0"/>
@@ -4458,11 +4496,7 @@
             </a:r>
             <a:r>
               <a:rPr lang="en-US" dirty="0" smtClean="0"/>
-              <a:t>, code to value of similar corresponding careers and </a:t>
-            </a:r>
-            <a:r>
-              <a:rPr lang="en-US" dirty="0" smtClean="0"/>
-              <a:t>fields</a:t>
+              <a:t>, code to value of similar corresponding careers and fields</a:t>
             </a:r>
           </a:p>
           <a:p>
@@ -4570,11 +4604,7 @@
           <a:p>
             <a:r>
               <a:rPr lang="en-US" dirty="0" smtClean="0"/>
-              <a:t>We see an increase in goal 4 which is “Looking for a serious relationship” as age </a:t>
-            </a:r>
-            <a:r>
-              <a:rPr lang="en-US" dirty="0" smtClean="0"/>
-              <a:t>increases</a:t>
+              <a:t>We see an increase in goal 4 which is “Looking for a serious relationship” as age increases</a:t>
             </a:r>
           </a:p>
           <a:p>
@@ -4950,6 +4980,33 @@
             </a:r>
           </a:p>
           <a:p>
+            <a:endParaRPr lang="en-US" dirty="0" smtClean="0"/>
+          </a:p>
+          <a:p>
+            <a:endParaRPr lang="en-US" dirty="0"/>
+          </a:p>
+          <a:p>
+            <a:endParaRPr lang="en-US" dirty="0" smtClean="0"/>
+          </a:p>
+          <a:p>
+            <a:r>
+              <a:rPr lang="en-US" dirty="0" smtClean="0"/>
+              <a:t>We also see that many of </a:t>
+            </a:r>
+            <a:br>
+              <a:rPr lang="en-US" dirty="0" smtClean="0"/>
+            </a:br>
+            <a:r>
+              <a:rPr lang="en-US" dirty="0" smtClean="0"/>
+              <a:t>these tweets have joy as</a:t>
+            </a:r>
+            <a:br>
+              <a:rPr lang="en-US" dirty="0" smtClean="0"/>
+            </a:br>
+            <a:r>
+              <a:rPr lang="en-US" smtClean="0"/>
+              <a:t>the emotion</a:t>
+            </a:r>
             <a:endParaRPr lang="en-US" dirty="0"/>
           </a:p>
           <a:p>
@@ -4964,35 +5021,6 @@
               <a:rPr lang="en-US" dirty="0" smtClean="0"/>
             </a:br>
             <a:endParaRPr lang="en-US" dirty="0" smtClean="0"/>
-          </a:p>
-          <a:p>
-            <a:r>
-              <a:rPr lang="en-US" dirty="0" smtClean="0"/>
-              <a:t>A </a:t>
-            </a:r>
-            <a:r>
-              <a:rPr lang="en-US" dirty="0"/>
-              <a:t>few word clouds for the word </a:t>
-            </a:r>
-            <a:r>
-              <a:rPr lang="en-US" dirty="0" smtClean="0"/>
-              <a:t>“Romance”</a:t>
-            </a:r>
-            <a:endParaRPr lang="en-US" dirty="0"/>
-          </a:p>
-          <a:p>
-            <a:pPr lvl="1"/>
-            <a:r>
-              <a:rPr lang="en-US" dirty="0" smtClean="0"/>
-              <a:t>Everywhere is focused more on</a:t>
-            </a:r>
-            <a:br>
-              <a:rPr lang="en-US" dirty="0" smtClean="0"/>
-            </a:br>
-            <a:r>
-              <a:rPr lang="en-US" dirty="0" smtClean="0"/>
-              <a:t>book results</a:t>
-            </a:r>
           </a:p>
         </p:txBody>
       </p:sp>
@@ -5088,94 +5116,45 @@
       </p:sp>
       <p:pic>
         <p:nvPicPr>
-          <p:cNvPr id="7" name="Picture 6"/>
+          <p:cNvPr id="1026" name="Picture 2" descr="D:\Users\Bae\Documents\School\Fall 2016\DS 4559\Project 1\4559Project1\sent.png"/>
           <p:cNvPicPr>
-            <a:picLocks noChangeAspect="1"/>
+            <a:picLocks noChangeAspect="1" noChangeArrowheads="1"/>
           </p:cNvPicPr>
           <p:nvPr/>
         </p:nvPicPr>
         <p:blipFill>
-          <a:blip r:embed="rId4" cstate="print">
+          <a:blip r:embed="rId4">
             <a:extLst>
               <a:ext uri="{28A0092B-C50C-407E-A947-70E740481C1C}">
                 <a14:useLocalDpi xmlns:a14="http://schemas.microsoft.com/office/drawing/2010/main" val="0"/>
               </a:ext>
             </a:extLst>
           </a:blip>
+          <a:srcRect/>
           <a:stretch>
             <a:fillRect/>
           </a:stretch>
         </p:blipFill>
-        <p:spPr>
+        <p:spPr bwMode="auto">
           <a:xfrm>
-            <a:off x="7140920" y="4419601"/>
-            <a:ext cx="2189431" cy="1626655"/>
-          </a:xfrm>
-          <a:prstGeom prst="rect">
-            <a:avLst/>
-          </a:prstGeom>
-        </p:spPr>
-      </p:pic>
-      <p:pic>
-        <p:nvPicPr>
-          <p:cNvPr id="8" name="Picture 7"/>
-          <p:cNvPicPr>
-            <a:picLocks noChangeAspect="1"/>
-          </p:cNvPicPr>
-          <p:nvPr/>
-        </p:nvPicPr>
-        <p:blipFill>
-          <a:blip r:embed="rId5" cstate="print">
-            <a:extLst>
-              <a:ext uri="{28A0092B-C50C-407E-A947-70E740481C1C}">
-                <a14:useLocalDpi xmlns:a14="http://schemas.microsoft.com/office/drawing/2010/main" val="0"/>
-              </a:ext>
-            </a:extLst>
-          </a:blip>
-          <a:stretch>
-            <a:fillRect/>
-          </a:stretch>
-        </p:blipFill>
-        <p:spPr>
-          <a:xfrm>
-            <a:off x="5245846" y="4419599"/>
-            <a:ext cx="2189431" cy="1626655"/>
-          </a:xfrm>
-          <a:prstGeom prst="rect">
-            <a:avLst/>
-          </a:prstGeom>
-        </p:spPr>
-      </p:pic>
-      <p:sp>
-        <p:nvSpPr>
-          <p:cNvPr id="9" name="TextBox 8"/>
-          <p:cNvSpPr txBox="1"/>
-          <p:nvPr/>
-        </p:nvSpPr>
-        <p:spPr>
-          <a:xfrm>
-            <a:off x="5354369" y="6072696"/>
-            <a:ext cx="4114800" cy="307777"/>
+            <a:off x="4460895" y="3962400"/>
+            <a:ext cx="3498807" cy="2599465"/>
           </a:xfrm>
           <a:prstGeom prst="rect">
             <a:avLst/>
           </a:prstGeom>
           <a:noFill/>
+          <a:extLst>
+            <a:ext uri="{909E8E84-426E-40DD-AFC4-6F175D3DCCD1}">
+              <a14:hiddenFill xmlns:a14="http://schemas.microsoft.com/office/drawing/2010/main">
+                <a:solidFill>
+                  <a:srgbClr val="FFFFFF"/>
+                </a:solidFill>
+              </a14:hiddenFill>
+            </a:ext>
+          </a:extLst>
         </p:spPr>
-        <p:txBody>
-          <a:bodyPr wrap="square" rtlCol="0">
-            <a:spAutoFit/>
-          </a:bodyPr>
-          <a:lstStyle/>
-          <a:p>
-            <a:r>
-              <a:rPr lang="en-US" sz="1400" dirty="0" smtClean="0"/>
-              <a:t>Left: Charlottesville, Right: Everywhere</a:t>
-            </a:r>
-            <a:endParaRPr lang="en-US" sz="1400" dirty="0"/>
-          </a:p>
-        </p:txBody>
-      </p:sp>
+      </p:pic>
     </p:spTree>
     <p:extLst>
       <p:ext uri="{BB962C8B-B14F-4D97-AF65-F5344CB8AC3E}">
@@ -5221,37 +5200,203 @@
           <a:bodyPr/>
           <a:lstStyle/>
           <a:p>
-            <a:r>
-              <a:rPr lang="en-US" dirty="0" smtClean="0"/>
-              <a:t>Classification</a:t>
-            </a:r>
+            <a:endParaRPr lang="en-US"/>
+          </a:p>
+        </p:txBody>
+      </p:sp>
+      <p:sp>
+        <p:nvSpPr>
+          <p:cNvPr id="3" name="Content Placeholder 2"/>
+          <p:cNvSpPr>
+            <a:spLocks noGrp="1"/>
+          </p:cNvSpPr>
+          <p:nvPr>
+            <p:ph idx="1"/>
+          </p:nvPr>
+        </p:nvSpPr>
+        <p:spPr/>
+        <p:txBody>
+          <a:bodyPr/>
+          <a:lstStyle/>
+          <a:p>
+            <a:r>
+              <a:rPr lang="en-US" dirty="0"/>
+              <a:t>A few word clouds for the word “Romance”</a:t>
+            </a:r>
+          </a:p>
+          <a:p>
+            <a:pPr lvl="1"/>
+            <a:r>
+              <a:rPr lang="en-US" dirty="0"/>
+              <a:t>Everywhere is focused more on</a:t>
+            </a:r>
+            <a:br>
+              <a:rPr lang="en-US" dirty="0"/>
+            </a:br>
+            <a:r>
+              <a:rPr lang="en-US" dirty="0"/>
+              <a:t>book results</a:t>
+            </a:r>
+          </a:p>
+          <a:p>
             <a:endParaRPr lang="en-US" dirty="0"/>
           </a:p>
         </p:txBody>
       </p:sp>
-      <p:sp>
-        <p:nvSpPr>
-          <p:cNvPr id="3" name="Content Placeholder 2"/>
-          <p:cNvSpPr>
-            <a:spLocks noGrp="1"/>
-          </p:cNvSpPr>
-          <p:nvPr>
-            <p:ph idx="1"/>
-          </p:nvPr>
-        </p:nvSpPr>
-        <p:spPr/>
-        <p:txBody>
-          <a:bodyPr/>
-          <a:lstStyle/>
-          <a:p>
-            <a:endParaRPr lang="en-US"/>
-          </a:p>
-        </p:txBody>
-      </p:sp>
+      <p:pic>
+        <p:nvPicPr>
+          <p:cNvPr id="4" name="Picture 3"/>
+          <p:cNvPicPr>
+            <a:picLocks noChangeAspect="1"/>
+          </p:cNvPicPr>
+          <p:nvPr/>
+        </p:nvPicPr>
+        <p:blipFill>
+          <a:blip r:embed="rId2" cstate="print">
+            <a:extLst>
+              <a:ext uri="{28A0092B-C50C-407E-A947-70E740481C1C}">
+                <a14:useLocalDpi xmlns:a14="http://schemas.microsoft.com/office/drawing/2010/main" val="0"/>
+              </a:ext>
+            </a:extLst>
+          </a:blip>
+          <a:stretch>
+            <a:fillRect/>
+          </a:stretch>
+        </p:blipFill>
+        <p:spPr>
+          <a:xfrm>
+            <a:off x="4059226" y="3505200"/>
+            <a:ext cx="2189431" cy="1626655"/>
+          </a:xfrm>
+          <a:prstGeom prst="rect">
+            <a:avLst/>
+          </a:prstGeom>
+        </p:spPr>
+      </p:pic>
+      <p:pic>
+        <p:nvPicPr>
+          <p:cNvPr id="5" name="Picture 4"/>
+          <p:cNvPicPr>
+            <a:picLocks noChangeAspect="1"/>
+          </p:cNvPicPr>
+          <p:nvPr/>
+        </p:nvPicPr>
+        <p:blipFill>
+          <a:blip r:embed="rId3" cstate="print">
+            <a:extLst>
+              <a:ext uri="{28A0092B-C50C-407E-A947-70E740481C1C}">
+                <a14:useLocalDpi xmlns:a14="http://schemas.microsoft.com/office/drawing/2010/main" val="0"/>
+              </a:ext>
+            </a:extLst>
+          </a:blip>
+          <a:stretch>
+            <a:fillRect/>
+          </a:stretch>
+        </p:blipFill>
+        <p:spPr>
+          <a:xfrm>
+            <a:off x="2228899" y="3505200"/>
+            <a:ext cx="2189431" cy="1626655"/>
+          </a:xfrm>
+          <a:prstGeom prst="rect">
+            <a:avLst/>
+          </a:prstGeom>
+        </p:spPr>
+      </p:pic>
+      <p:sp>
+        <p:nvSpPr>
+          <p:cNvPr id="6" name="TextBox 5"/>
+          <p:cNvSpPr txBox="1"/>
+          <p:nvPr/>
+        </p:nvSpPr>
+        <p:spPr>
+          <a:xfrm>
+            <a:off x="3200400" y="5131855"/>
+            <a:ext cx="4114800" cy="307777"/>
+          </a:xfrm>
+          <a:prstGeom prst="rect">
+            <a:avLst/>
+          </a:prstGeom>
+          <a:noFill/>
+        </p:spPr>
+        <p:txBody>
+          <a:bodyPr wrap="square" rtlCol="0">
+            <a:spAutoFit/>
+          </a:bodyPr>
+          <a:lstStyle/>
+          <a:p>
+            <a:r>
+              <a:rPr lang="en-US" sz="1400" dirty="0" smtClean="0"/>
+              <a:t>Left: Charlottesville, Right: Everywhere</a:t>
+            </a:r>
+            <a:endParaRPr lang="en-US" sz="1400" dirty="0"/>
+          </a:p>
+        </p:txBody>
+      </p:sp>
+      <p:pic>
+        <p:nvPicPr>
+          <p:cNvPr id="7" name="Picture 6"/>
+          <p:cNvPicPr>
+            <a:picLocks noChangeAspect="1"/>
+          </p:cNvPicPr>
+          <p:nvPr/>
+        </p:nvPicPr>
+        <p:blipFill>
+          <a:blip r:embed="rId2" cstate="print">
+            <a:extLst>
+              <a:ext uri="{28A0092B-C50C-407E-A947-70E740481C1C}">
+                <a14:useLocalDpi xmlns:a14="http://schemas.microsoft.com/office/drawing/2010/main" val="0"/>
+              </a:ext>
+            </a:extLst>
+          </a:blip>
+          <a:stretch>
+            <a:fillRect/>
+          </a:stretch>
+        </p:blipFill>
+        <p:spPr>
+          <a:xfrm>
+            <a:off x="4516425" y="2762548"/>
+            <a:ext cx="3255975" cy="2419052"/>
+          </a:xfrm>
+          <a:prstGeom prst="rect">
+            <a:avLst/>
+          </a:prstGeom>
+        </p:spPr>
+      </p:pic>
+      <p:pic>
+        <p:nvPicPr>
+          <p:cNvPr id="8" name="Picture 7"/>
+          <p:cNvPicPr>
+            <a:picLocks noChangeAspect="1"/>
+          </p:cNvPicPr>
+          <p:nvPr/>
+        </p:nvPicPr>
+        <p:blipFill>
+          <a:blip r:embed="rId3" cstate="print">
+            <a:extLst>
+              <a:ext uri="{28A0092B-C50C-407E-A947-70E740481C1C}">
+                <a14:useLocalDpi xmlns:a14="http://schemas.microsoft.com/office/drawing/2010/main" val="0"/>
+              </a:ext>
+            </a:extLst>
+          </a:blip>
+          <a:stretch>
+            <a:fillRect/>
+          </a:stretch>
+        </p:blipFill>
+        <p:spPr>
+          <a:xfrm>
+            <a:off x="1827273" y="2739243"/>
+            <a:ext cx="3255975" cy="2419052"/>
+          </a:xfrm>
+          <a:prstGeom prst="rect">
+            <a:avLst/>
+          </a:prstGeom>
+        </p:spPr>
+      </p:pic>
     </p:spTree>
     <p:extLst>
       <p:ext uri="{BB962C8B-B14F-4D97-AF65-F5344CB8AC3E}">
-        <p14:creationId xmlns:p14="http://schemas.microsoft.com/office/powerpoint/2010/main" val="951282186"/>
+        <p14:creationId xmlns:p14="http://schemas.microsoft.com/office/powerpoint/2010/main" val="1703548439"/>
       </p:ext>
     </p:extLst>
   </p:cSld>

</xml_diff>